<commit_message>
Actualización Readme con imagenes
</commit_message>
<xml_diff>
--- a/images/WaterTankController.pptx
+++ b/images/WaterTankController.pptx
@@ -9,8 +9,8 @@
     <p:sldId id="257" r:id="rId3"/>
     <p:sldId id="258" r:id="rId4"/>
     <p:sldId id="259" r:id="rId5"/>
-    <p:sldId id="261" r:id="rId6"/>
-    <p:sldId id="262" r:id="rId7"/>
+    <p:sldId id="262" r:id="rId6"/>
+    <p:sldId id="263" r:id="rId7"/>
   </p:sldIdLst>
   <p:sldSz cx="12192000" cy="6858000"/>
   <p:notesSz cx="6858000" cy="9144000"/>
@@ -266,7 +266,7 @@
           <a:p>
             <a:fld id="{084A5F87-CFEC-6C45-82EB-86B98C763EAA}" type="datetimeFigureOut">
               <a:rPr lang="en-AR" smtClean="0"/>
-              <a:t>29/10/2020</a:t>
+              <a:t>04/11/2020</a:t>
             </a:fld>
             <a:endParaRPr lang="en-AR"/>
           </a:p>
@@ -466,7 +466,7 @@
           <a:p>
             <a:fld id="{084A5F87-CFEC-6C45-82EB-86B98C763EAA}" type="datetimeFigureOut">
               <a:rPr lang="en-AR" smtClean="0"/>
-              <a:t>29/10/2020</a:t>
+              <a:t>04/11/2020</a:t>
             </a:fld>
             <a:endParaRPr lang="en-AR"/>
           </a:p>
@@ -676,7 +676,7 @@
           <a:p>
             <a:fld id="{084A5F87-CFEC-6C45-82EB-86B98C763EAA}" type="datetimeFigureOut">
               <a:rPr lang="en-AR" smtClean="0"/>
-              <a:t>29/10/2020</a:t>
+              <a:t>04/11/2020</a:t>
             </a:fld>
             <a:endParaRPr lang="en-AR"/>
           </a:p>
@@ -876,7 +876,7 @@
           <a:p>
             <a:fld id="{084A5F87-CFEC-6C45-82EB-86B98C763EAA}" type="datetimeFigureOut">
               <a:rPr lang="en-AR" smtClean="0"/>
-              <a:t>29/10/2020</a:t>
+              <a:t>04/11/2020</a:t>
             </a:fld>
             <a:endParaRPr lang="en-AR"/>
           </a:p>
@@ -1152,7 +1152,7 @@
           <a:p>
             <a:fld id="{084A5F87-CFEC-6C45-82EB-86B98C763EAA}" type="datetimeFigureOut">
               <a:rPr lang="en-AR" smtClean="0"/>
-              <a:t>29/10/2020</a:t>
+              <a:t>04/11/2020</a:t>
             </a:fld>
             <a:endParaRPr lang="en-AR"/>
           </a:p>
@@ -1420,7 +1420,7 @@
           <a:p>
             <a:fld id="{084A5F87-CFEC-6C45-82EB-86B98C763EAA}" type="datetimeFigureOut">
               <a:rPr lang="en-AR" smtClean="0"/>
-              <a:t>29/10/2020</a:t>
+              <a:t>04/11/2020</a:t>
             </a:fld>
             <a:endParaRPr lang="en-AR"/>
           </a:p>
@@ -1835,7 +1835,7 @@
           <a:p>
             <a:fld id="{084A5F87-CFEC-6C45-82EB-86B98C763EAA}" type="datetimeFigureOut">
               <a:rPr lang="en-AR" smtClean="0"/>
-              <a:t>29/10/2020</a:t>
+              <a:t>04/11/2020</a:t>
             </a:fld>
             <a:endParaRPr lang="en-AR"/>
           </a:p>
@@ -1977,7 +1977,7 @@
           <a:p>
             <a:fld id="{084A5F87-CFEC-6C45-82EB-86B98C763EAA}" type="datetimeFigureOut">
               <a:rPr lang="en-AR" smtClean="0"/>
-              <a:t>29/10/2020</a:t>
+              <a:t>04/11/2020</a:t>
             </a:fld>
             <a:endParaRPr lang="en-AR"/>
           </a:p>
@@ -2090,7 +2090,7 @@
           <a:p>
             <a:fld id="{084A5F87-CFEC-6C45-82EB-86B98C763EAA}" type="datetimeFigureOut">
               <a:rPr lang="en-AR" smtClean="0"/>
-              <a:t>29/10/2020</a:t>
+              <a:t>04/11/2020</a:t>
             </a:fld>
             <a:endParaRPr lang="en-AR"/>
           </a:p>
@@ -2403,7 +2403,7 @@
           <a:p>
             <a:fld id="{084A5F87-CFEC-6C45-82EB-86B98C763EAA}" type="datetimeFigureOut">
               <a:rPr lang="en-AR" smtClean="0"/>
-              <a:t>29/10/2020</a:t>
+              <a:t>04/11/2020</a:t>
             </a:fld>
             <a:endParaRPr lang="en-AR"/>
           </a:p>
@@ -2692,7 +2692,7 @@
           <a:p>
             <a:fld id="{084A5F87-CFEC-6C45-82EB-86B98C763EAA}" type="datetimeFigureOut">
               <a:rPr lang="en-AR" smtClean="0"/>
-              <a:t>29/10/2020</a:t>
+              <a:t>04/11/2020</a:t>
             </a:fld>
             <a:endParaRPr lang="en-AR"/>
           </a:p>
@@ -2935,7 +2935,7 @@
           <a:p>
             <a:fld id="{084A5F87-CFEC-6C45-82EB-86B98C763EAA}" type="datetimeFigureOut">
               <a:rPr lang="en-AR" smtClean="0"/>
-              <a:t>29/10/2020</a:t>
+              <a:t>04/11/2020</a:t>
             </a:fld>
             <a:endParaRPr lang="en-AR"/>
           </a:p>
@@ -10976,810 +10976,6 @@
     <p:bg>
       <p:bgPr>
         <a:solidFill>
-          <a:schemeClr val="bg1"/>
-        </a:solidFill>
-        <a:effectLst/>
-      </p:bgPr>
-    </p:bg>
-    <p:spTree>
-      <p:nvGrpSpPr>
-        <p:cNvPr id="1" name=""/>
-        <p:cNvGrpSpPr/>
-        <p:nvPr/>
-      </p:nvGrpSpPr>
-      <p:grpSpPr>
-        <a:xfrm>
-          <a:off x="0" y="0"/>
-          <a:ext cx="0" cy="0"/>
-          <a:chOff x="0" y="0"/>
-          <a:chExt cx="0" cy="0"/>
-        </a:xfrm>
-      </p:grpSpPr>
-      <p:sp>
-        <p:nvSpPr>
-          <p:cNvPr id="36" name="Freeform: Shape 32">
-            <a:extLst>
-              <a:ext uri="{FF2B5EF4-FFF2-40B4-BE49-F238E27FC236}">
-                <a16:creationId xmlns:a16="http://schemas.microsoft.com/office/drawing/2014/main" id="{1284CA7F-B696-4085-84C6-CD668817E685}"/>
-              </a:ext>
-              <a:ext uri="{C183D7F6-B498-43B3-948B-1728B52AA6E4}">
-                <adec:decorative xmlns:adec="http://schemas.microsoft.com/office/drawing/2017/decorative" val="1"/>
-              </a:ext>
-            </a:extLst>
-          </p:cNvPr>
-          <p:cNvSpPr>
-            <a:spLocks noGrp="1" noRot="1" noChangeAspect="1" noMove="1" noResize="1" noEditPoints="1" noAdjustHandles="1" noChangeArrowheads="1" noChangeShapeType="1" noTextEdit="1"/>
-          </p:cNvSpPr>
-          <p:nvPr>
-            <p:extLst>
-              <p:ext uri="{386F3935-93C4-4BCD-93E2-E3B085C9AB24}">
-                <p16:designElem xmlns:p16="http://schemas.microsoft.com/office/powerpoint/2015/main" val="1"/>
-              </p:ext>
-            </p:extLst>
-          </p:nvPr>
-        </p:nvSpPr>
-        <p:spPr>
-          <a:xfrm>
-            <a:off x="0" y="1"/>
-            <a:ext cx="6050278" cy="3400925"/>
-          </a:xfrm>
-          <a:custGeom>
-            <a:avLst/>
-            <a:gdLst>
-              <a:gd name="connsiteX0" fmla="*/ 0 w 6050278"/>
-              <a:gd name="connsiteY0" fmla="*/ 0 h 3400925"/>
-              <a:gd name="connsiteX1" fmla="*/ 6050278 w 6050278"/>
-              <a:gd name="connsiteY1" fmla="*/ 0 h 3400925"/>
-              <a:gd name="connsiteX2" fmla="*/ 6050278 w 6050278"/>
-              <a:gd name="connsiteY2" fmla="*/ 1827306 h 3400925"/>
-              <a:gd name="connsiteX3" fmla="*/ 3892296 w 6050278"/>
-              <a:gd name="connsiteY3" fmla="*/ 1827306 h 3400925"/>
-              <a:gd name="connsiteX4" fmla="*/ 3892296 w 6050278"/>
-              <a:gd name="connsiteY4" fmla="*/ 3400925 h 3400925"/>
-              <a:gd name="connsiteX5" fmla="*/ 0 w 6050278"/>
-              <a:gd name="connsiteY5" fmla="*/ 3400925 h 3400925"/>
-            </a:gdLst>
-            <a:ahLst/>
-            <a:cxnLst>
-              <a:cxn ang="0">
-                <a:pos x="connsiteX0" y="connsiteY0"/>
-              </a:cxn>
-              <a:cxn ang="0">
-                <a:pos x="connsiteX1" y="connsiteY1"/>
-              </a:cxn>
-              <a:cxn ang="0">
-                <a:pos x="connsiteX2" y="connsiteY2"/>
-              </a:cxn>
-              <a:cxn ang="0">
-                <a:pos x="connsiteX3" y="connsiteY3"/>
-              </a:cxn>
-              <a:cxn ang="0">
-                <a:pos x="connsiteX4" y="connsiteY4"/>
-              </a:cxn>
-              <a:cxn ang="0">
-                <a:pos x="connsiteX5" y="connsiteY5"/>
-              </a:cxn>
-            </a:cxnLst>
-            <a:rect l="l" t="t" r="r" b="b"/>
-            <a:pathLst>
-              <a:path w="6050278" h="3400925">
-                <a:moveTo>
-                  <a:pt x="0" y="0"/>
-                </a:moveTo>
-                <a:lnTo>
-                  <a:pt x="6050278" y="0"/>
-                </a:lnTo>
-                <a:lnTo>
-                  <a:pt x="6050278" y="1827306"/>
-                </a:lnTo>
-                <a:lnTo>
-                  <a:pt x="3892296" y="1827306"/>
-                </a:lnTo>
-                <a:lnTo>
-                  <a:pt x="3892296" y="3400925"/>
-                </a:lnTo>
-                <a:lnTo>
-                  <a:pt x="0" y="3400925"/>
-                </a:lnTo>
-                <a:close/>
-              </a:path>
-            </a:pathLst>
-          </a:custGeom>
-          <a:solidFill>
-            <a:schemeClr val="tx1">
-              <a:lumMod val="75000"/>
-              <a:lumOff val="25000"/>
-            </a:schemeClr>
-          </a:solidFill>
-          <a:ln>
-            <a:noFill/>
-          </a:ln>
-        </p:spPr>
-        <p:style>
-          <a:lnRef idx="2">
-            <a:schemeClr val="accent1">
-              <a:shade val="50000"/>
-            </a:schemeClr>
-          </a:lnRef>
-          <a:fillRef idx="1">
-            <a:schemeClr val="accent1"/>
-          </a:fillRef>
-          <a:effectRef idx="0">
-            <a:schemeClr val="accent1"/>
-          </a:effectRef>
-          <a:fontRef idx="minor">
-            <a:schemeClr val="lt1"/>
-          </a:fontRef>
-        </p:style>
-        <p:txBody>
-          <a:bodyPr wrap="square" rtlCol="0" anchor="ctr">
-            <a:noAutofit/>
-          </a:bodyPr>
-          <a:lstStyle/>
-          <a:p>
-            <a:pPr algn="ctr"/>
-            <a:endParaRPr lang="en-US"/>
-          </a:p>
-        </p:txBody>
-      </p:sp>
-      <p:pic>
-        <p:nvPicPr>
-          <p:cNvPr id="11" name="Picture 10" descr="Chart, line chart&#10;&#10;Description automatically generated">
-            <a:extLst>
-              <a:ext uri="{FF2B5EF4-FFF2-40B4-BE49-F238E27FC236}">
-                <a16:creationId xmlns:a16="http://schemas.microsoft.com/office/drawing/2014/main" id="{432F4DCE-4C68-0B45-B8F3-DA8B6372342D}"/>
-              </a:ext>
-            </a:extLst>
-          </p:cNvPr>
-          <p:cNvPicPr>
-            <a:picLocks noChangeAspect="1"/>
-          </p:cNvPicPr>
-          <p:nvPr/>
-        </p:nvPicPr>
-        <p:blipFill rotWithShape="1">
-          <a:blip r:embed="rId2"/>
-          <a:srcRect t="656" r="-3" b="9979"/>
-          <a:stretch/>
-        </p:blipFill>
-        <p:spPr>
-          <a:xfrm>
-            <a:off x="643467" y="707152"/>
-            <a:ext cx="2927073" cy="2308355"/>
-          </a:xfrm>
-          <a:prstGeom prst="rect">
-            <a:avLst/>
-          </a:prstGeom>
-        </p:spPr>
-      </p:pic>
-      <p:sp>
-        <p:nvSpPr>
-          <p:cNvPr id="35" name="Freeform: Shape 34">
-            <a:extLst>
-              <a:ext uri="{FF2B5EF4-FFF2-40B4-BE49-F238E27FC236}">
-                <a16:creationId xmlns:a16="http://schemas.microsoft.com/office/drawing/2014/main" id="{858A10F4-B847-4777-BC82-782F6FB36E40}"/>
-              </a:ext>
-              <a:ext uri="{C183D7F6-B498-43B3-948B-1728B52AA6E4}">
-                <adec:decorative xmlns:adec="http://schemas.microsoft.com/office/drawing/2017/decorative" val="1"/>
-              </a:ext>
-            </a:extLst>
-          </p:cNvPr>
-          <p:cNvSpPr>
-            <a:spLocks noGrp="1" noRot="1" noChangeAspect="1" noMove="1" noResize="1" noEditPoints="1" noAdjustHandles="1" noChangeArrowheads="1" noChangeShapeType="1" noTextEdit="1"/>
-          </p:cNvSpPr>
-          <p:nvPr>
-            <p:extLst>
-              <p:ext uri="{386F3935-93C4-4BCD-93E2-E3B085C9AB24}">
-                <p16:designElem xmlns:p16="http://schemas.microsoft.com/office/powerpoint/2015/main" val="1"/>
-              </p:ext>
-            </p:extLst>
-          </p:nvPr>
-        </p:nvSpPr>
-        <p:spPr>
-          <a:xfrm>
-            <a:off x="6141722" y="1"/>
-            <a:ext cx="6050278" cy="3400925"/>
-          </a:xfrm>
-          <a:custGeom>
-            <a:avLst/>
-            <a:gdLst>
-              <a:gd name="connsiteX0" fmla="*/ 0 w 6050278"/>
-              <a:gd name="connsiteY0" fmla="*/ 0 h 3400925"/>
-              <a:gd name="connsiteX1" fmla="*/ 6050278 w 6050278"/>
-              <a:gd name="connsiteY1" fmla="*/ 0 h 3400925"/>
-              <a:gd name="connsiteX2" fmla="*/ 6050278 w 6050278"/>
-              <a:gd name="connsiteY2" fmla="*/ 3400925 h 3400925"/>
-              <a:gd name="connsiteX3" fmla="*/ 2157982 w 6050278"/>
-              <a:gd name="connsiteY3" fmla="*/ 3400925 h 3400925"/>
-              <a:gd name="connsiteX4" fmla="*/ 2157982 w 6050278"/>
-              <a:gd name="connsiteY4" fmla="*/ 1827306 h 3400925"/>
-              <a:gd name="connsiteX5" fmla="*/ 0 w 6050278"/>
-              <a:gd name="connsiteY5" fmla="*/ 1827306 h 3400925"/>
-            </a:gdLst>
-            <a:ahLst/>
-            <a:cxnLst>
-              <a:cxn ang="0">
-                <a:pos x="connsiteX0" y="connsiteY0"/>
-              </a:cxn>
-              <a:cxn ang="0">
-                <a:pos x="connsiteX1" y="connsiteY1"/>
-              </a:cxn>
-              <a:cxn ang="0">
-                <a:pos x="connsiteX2" y="connsiteY2"/>
-              </a:cxn>
-              <a:cxn ang="0">
-                <a:pos x="connsiteX3" y="connsiteY3"/>
-              </a:cxn>
-              <a:cxn ang="0">
-                <a:pos x="connsiteX4" y="connsiteY4"/>
-              </a:cxn>
-              <a:cxn ang="0">
-                <a:pos x="connsiteX5" y="connsiteY5"/>
-              </a:cxn>
-            </a:cxnLst>
-            <a:rect l="l" t="t" r="r" b="b"/>
-            <a:pathLst>
-              <a:path w="6050278" h="3400925">
-                <a:moveTo>
-                  <a:pt x="0" y="0"/>
-                </a:moveTo>
-                <a:lnTo>
-                  <a:pt x="6050278" y="0"/>
-                </a:lnTo>
-                <a:lnTo>
-                  <a:pt x="6050278" y="3400925"/>
-                </a:lnTo>
-                <a:lnTo>
-                  <a:pt x="2157982" y="3400925"/>
-                </a:lnTo>
-                <a:lnTo>
-                  <a:pt x="2157982" y="1827306"/>
-                </a:lnTo>
-                <a:lnTo>
-                  <a:pt x="0" y="1827306"/>
-                </a:lnTo>
-                <a:close/>
-              </a:path>
-            </a:pathLst>
-          </a:custGeom>
-          <a:solidFill>
-            <a:schemeClr val="tx1">
-              <a:lumMod val="75000"/>
-              <a:lumOff val="25000"/>
-            </a:schemeClr>
-          </a:solidFill>
-          <a:ln>
-            <a:noFill/>
-          </a:ln>
-        </p:spPr>
-        <p:style>
-          <a:lnRef idx="2">
-            <a:schemeClr val="accent1">
-              <a:shade val="50000"/>
-            </a:schemeClr>
-          </a:lnRef>
-          <a:fillRef idx="1">
-            <a:schemeClr val="accent1"/>
-          </a:fillRef>
-          <a:effectRef idx="0">
-            <a:schemeClr val="accent1"/>
-          </a:effectRef>
-          <a:fontRef idx="minor">
-            <a:schemeClr val="lt1"/>
-          </a:fontRef>
-        </p:style>
-        <p:txBody>
-          <a:bodyPr wrap="square" rtlCol="0" anchor="ctr">
-            <a:noAutofit/>
-          </a:bodyPr>
-          <a:lstStyle/>
-          <a:p>
-            <a:pPr algn="ctr"/>
-            <a:endParaRPr lang="en-US"/>
-          </a:p>
-        </p:txBody>
-      </p:sp>
-      <p:sp>
-        <p:nvSpPr>
-          <p:cNvPr id="37" name="Freeform: Shape 36">
-            <a:extLst>
-              <a:ext uri="{FF2B5EF4-FFF2-40B4-BE49-F238E27FC236}">
-                <a16:creationId xmlns:a16="http://schemas.microsoft.com/office/drawing/2014/main" id="{8883B597-C9A1-46EF-AB6B-71DF0B1ED4A6}"/>
-              </a:ext>
-              <a:ext uri="{C183D7F6-B498-43B3-948B-1728B52AA6E4}">
-                <adec:decorative xmlns:adec="http://schemas.microsoft.com/office/drawing/2017/decorative" val="1"/>
-              </a:ext>
-            </a:extLst>
-          </p:cNvPr>
-          <p:cNvSpPr>
-            <a:spLocks noGrp="1" noRot="1" noChangeAspect="1" noMove="1" noResize="1" noEditPoints="1" noAdjustHandles="1" noChangeArrowheads="1" noChangeShapeType="1" noTextEdit="1"/>
-          </p:cNvSpPr>
-          <p:nvPr>
-            <p:extLst>
-              <p:ext uri="{386F3935-93C4-4BCD-93E2-E3B085C9AB24}">
-                <p16:designElem xmlns:p16="http://schemas.microsoft.com/office/powerpoint/2015/main" val="1"/>
-              </p:ext>
-            </p:extLst>
-          </p:nvPr>
-        </p:nvSpPr>
-        <p:spPr>
-          <a:xfrm>
-            <a:off x="0" y="3489159"/>
-            <a:ext cx="6050278" cy="3368841"/>
-          </a:xfrm>
-          <a:custGeom>
-            <a:avLst/>
-            <a:gdLst>
-              <a:gd name="connsiteX0" fmla="*/ 0 w 6050278"/>
-              <a:gd name="connsiteY0" fmla="*/ 0 h 3368841"/>
-              <a:gd name="connsiteX1" fmla="*/ 3892296 w 6050278"/>
-              <a:gd name="connsiteY1" fmla="*/ 0 h 3368841"/>
-              <a:gd name="connsiteX2" fmla="*/ 3892296 w 6050278"/>
-              <a:gd name="connsiteY2" fmla="*/ 1541535 h 3368841"/>
-              <a:gd name="connsiteX3" fmla="*/ 6050278 w 6050278"/>
-              <a:gd name="connsiteY3" fmla="*/ 1541535 h 3368841"/>
-              <a:gd name="connsiteX4" fmla="*/ 6050278 w 6050278"/>
-              <a:gd name="connsiteY4" fmla="*/ 3368841 h 3368841"/>
-              <a:gd name="connsiteX5" fmla="*/ 0 w 6050278"/>
-              <a:gd name="connsiteY5" fmla="*/ 3368841 h 3368841"/>
-            </a:gdLst>
-            <a:ahLst/>
-            <a:cxnLst>
-              <a:cxn ang="0">
-                <a:pos x="connsiteX0" y="connsiteY0"/>
-              </a:cxn>
-              <a:cxn ang="0">
-                <a:pos x="connsiteX1" y="connsiteY1"/>
-              </a:cxn>
-              <a:cxn ang="0">
-                <a:pos x="connsiteX2" y="connsiteY2"/>
-              </a:cxn>
-              <a:cxn ang="0">
-                <a:pos x="connsiteX3" y="connsiteY3"/>
-              </a:cxn>
-              <a:cxn ang="0">
-                <a:pos x="connsiteX4" y="connsiteY4"/>
-              </a:cxn>
-              <a:cxn ang="0">
-                <a:pos x="connsiteX5" y="connsiteY5"/>
-              </a:cxn>
-            </a:cxnLst>
-            <a:rect l="l" t="t" r="r" b="b"/>
-            <a:pathLst>
-              <a:path w="6050278" h="3368841">
-                <a:moveTo>
-                  <a:pt x="0" y="0"/>
-                </a:moveTo>
-                <a:lnTo>
-                  <a:pt x="3892296" y="0"/>
-                </a:lnTo>
-                <a:lnTo>
-                  <a:pt x="3892296" y="1541535"/>
-                </a:lnTo>
-                <a:lnTo>
-                  <a:pt x="6050278" y="1541535"/>
-                </a:lnTo>
-                <a:lnTo>
-                  <a:pt x="6050278" y="3368841"/>
-                </a:lnTo>
-                <a:lnTo>
-                  <a:pt x="0" y="3368841"/>
-                </a:lnTo>
-                <a:close/>
-              </a:path>
-            </a:pathLst>
-          </a:custGeom>
-          <a:solidFill>
-            <a:schemeClr val="tx1">
-              <a:lumMod val="75000"/>
-              <a:lumOff val="25000"/>
-            </a:schemeClr>
-          </a:solidFill>
-          <a:ln>
-            <a:noFill/>
-          </a:ln>
-        </p:spPr>
-        <p:style>
-          <a:lnRef idx="2">
-            <a:schemeClr val="accent1">
-              <a:shade val="50000"/>
-            </a:schemeClr>
-          </a:lnRef>
-          <a:fillRef idx="1">
-            <a:schemeClr val="accent1"/>
-          </a:fillRef>
-          <a:effectRef idx="0">
-            <a:schemeClr val="accent1"/>
-          </a:effectRef>
-          <a:fontRef idx="minor">
-            <a:schemeClr val="lt1"/>
-          </a:fontRef>
-        </p:style>
-        <p:txBody>
-          <a:bodyPr wrap="square" rtlCol="0" anchor="ctr">
-            <a:noAutofit/>
-          </a:bodyPr>
-          <a:lstStyle/>
-          <a:p>
-            <a:pPr algn="ctr"/>
-            <a:endParaRPr lang="en-US"/>
-          </a:p>
-        </p:txBody>
-      </p:sp>
-      <p:pic>
-        <p:nvPicPr>
-          <p:cNvPr id="15" name="Picture 14" descr="Graphical user interface, application&#10;&#10;Description automatically generated">
-            <a:extLst>
-              <a:ext uri="{FF2B5EF4-FFF2-40B4-BE49-F238E27FC236}">
-                <a16:creationId xmlns:a16="http://schemas.microsoft.com/office/drawing/2014/main" id="{38868FF5-730D-E64B-A08D-4F0C4B0E2CCD}"/>
-              </a:ext>
-            </a:extLst>
-          </p:cNvPr>
-          <p:cNvPicPr>
-            <a:picLocks noChangeAspect="1"/>
-          </p:cNvPicPr>
-          <p:nvPr/>
-        </p:nvPicPr>
-        <p:blipFill>
-          <a:blip r:embed="rId3"/>
-          <a:stretch>
-            <a:fillRect/>
-          </a:stretch>
-        </p:blipFill>
-        <p:spPr>
-          <a:xfrm>
-            <a:off x="735819" y="3826725"/>
-            <a:ext cx="2742368" cy="2399572"/>
-          </a:xfrm>
-          <a:prstGeom prst="rect">
-            <a:avLst/>
-          </a:prstGeom>
-        </p:spPr>
-      </p:pic>
-      <p:sp>
-        <p:nvSpPr>
-          <p:cNvPr id="39" name="Freeform: Shape 38">
-            <a:extLst>
-              <a:ext uri="{FF2B5EF4-FFF2-40B4-BE49-F238E27FC236}">
-                <a16:creationId xmlns:a16="http://schemas.microsoft.com/office/drawing/2014/main" id="{A0B38421-369F-445C-9543-5BC17BC09040}"/>
-              </a:ext>
-              <a:ext uri="{C183D7F6-B498-43B3-948B-1728B52AA6E4}">
-                <adec:decorative xmlns:adec="http://schemas.microsoft.com/office/drawing/2017/decorative" val="1"/>
-              </a:ext>
-            </a:extLst>
-          </p:cNvPr>
-          <p:cNvSpPr>
-            <a:spLocks noGrp="1" noRot="1" noChangeAspect="1" noMove="1" noResize="1" noEditPoints="1" noAdjustHandles="1" noChangeArrowheads="1" noChangeShapeType="1" noTextEdit="1"/>
-          </p:cNvSpPr>
-          <p:nvPr>
-            <p:extLst>
-              <p:ext uri="{386F3935-93C4-4BCD-93E2-E3B085C9AB24}">
-                <p16:designElem xmlns:p16="http://schemas.microsoft.com/office/powerpoint/2015/main" val="1"/>
-              </p:ext>
-            </p:extLst>
-          </p:nvPr>
-        </p:nvSpPr>
-        <p:spPr>
-          <a:xfrm>
-            <a:off x="6141722" y="3489159"/>
-            <a:ext cx="6050278" cy="3368841"/>
-          </a:xfrm>
-          <a:custGeom>
-            <a:avLst/>
-            <a:gdLst>
-              <a:gd name="connsiteX0" fmla="*/ 2157982 w 6050278"/>
-              <a:gd name="connsiteY0" fmla="*/ 0 h 3368841"/>
-              <a:gd name="connsiteX1" fmla="*/ 6050278 w 6050278"/>
-              <a:gd name="connsiteY1" fmla="*/ 0 h 3368841"/>
-              <a:gd name="connsiteX2" fmla="*/ 6050278 w 6050278"/>
-              <a:gd name="connsiteY2" fmla="*/ 3368841 h 3368841"/>
-              <a:gd name="connsiteX3" fmla="*/ 0 w 6050278"/>
-              <a:gd name="connsiteY3" fmla="*/ 3368841 h 3368841"/>
-              <a:gd name="connsiteX4" fmla="*/ 0 w 6050278"/>
-              <a:gd name="connsiteY4" fmla="*/ 1541535 h 3368841"/>
-              <a:gd name="connsiteX5" fmla="*/ 2157982 w 6050278"/>
-              <a:gd name="connsiteY5" fmla="*/ 1541535 h 3368841"/>
-            </a:gdLst>
-            <a:ahLst/>
-            <a:cxnLst>
-              <a:cxn ang="0">
-                <a:pos x="connsiteX0" y="connsiteY0"/>
-              </a:cxn>
-              <a:cxn ang="0">
-                <a:pos x="connsiteX1" y="connsiteY1"/>
-              </a:cxn>
-              <a:cxn ang="0">
-                <a:pos x="connsiteX2" y="connsiteY2"/>
-              </a:cxn>
-              <a:cxn ang="0">
-                <a:pos x="connsiteX3" y="connsiteY3"/>
-              </a:cxn>
-              <a:cxn ang="0">
-                <a:pos x="connsiteX4" y="connsiteY4"/>
-              </a:cxn>
-              <a:cxn ang="0">
-                <a:pos x="connsiteX5" y="connsiteY5"/>
-              </a:cxn>
-            </a:cxnLst>
-            <a:rect l="l" t="t" r="r" b="b"/>
-            <a:pathLst>
-              <a:path w="6050278" h="3368841">
-                <a:moveTo>
-                  <a:pt x="2157982" y="0"/>
-                </a:moveTo>
-                <a:lnTo>
-                  <a:pt x="6050278" y="0"/>
-                </a:lnTo>
-                <a:lnTo>
-                  <a:pt x="6050278" y="3368841"/>
-                </a:lnTo>
-                <a:lnTo>
-                  <a:pt x="0" y="3368841"/>
-                </a:lnTo>
-                <a:lnTo>
-                  <a:pt x="0" y="1541535"/>
-                </a:lnTo>
-                <a:lnTo>
-                  <a:pt x="2157982" y="1541535"/>
-                </a:lnTo>
-                <a:close/>
-              </a:path>
-            </a:pathLst>
-          </a:custGeom>
-          <a:solidFill>
-            <a:schemeClr val="tx1">
-              <a:lumMod val="75000"/>
-              <a:lumOff val="25000"/>
-            </a:schemeClr>
-          </a:solidFill>
-          <a:ln>
-            <a:noFill/>
-          </a:ln>
-        </p:spPr>
-        <p:style>
-          <a:lnRef idx="2">
-            <a:schemeClr val="accent1">
-              <a:shade val="50000"/>
-            </a:schemeClr>
-          </a:lnRef>
-          <a:fillRef idx="1">
-            <a:schemeClr val="accent1"/>
-          </a:fillRef>
-          <a:effectRef idx="0">
-            <a:schemeClr val="accent1"/>
-          </a:effectRef>
-          <a:fontRef idx="minor">
-            <a:schemeClr val="lt1"/>
-          </a:fontRef>
-        </p:style>
-        <p:txBody>
-          <a:bodyPr wrap="square" rtlCol="0" anchor="ctr">
-            <a:noAutofit/>
-          </a:bodyPr>
-          <a:lstStyle/>
-          <a:p>
-            <a:pPr algn="ctr"/>
-            <a:endParaRPr lang="en-US"/>
-          </a:p>
-        </p:txBody>
-      </p:sp>
-      <p:sp>
-        <p:nvSpPr>
-          <p:cNvPr id="41" name="Freeform: Shape 40">
-            <a:extLst>
-              <a:ext uri="{FF2B5EF4-FFF2-40B4-BE49-F238E27FC236}">
-                <a16:creationId xmlns:a16="http://schemas.microsoft.com/office/drawing/2014/main" id="{FAA9CE81-CAF0-41E3-8E73-CAFA13A0B1A7}"/>
-              </a:ext>
-              <a:ext uri="{C183D7F6-B498-43B3-948B-1728B52AA6E4}">
-                <adec:decorative xmlns:adec="http://schemas.microsoft.com/office/drawing/2017/decorative" val="1"/>
-              </a:ext>
-            </a:extLst>
-          </p:cNvPr>
-          <p:cNvSpPr>
-            <a:spLocks noGrp="1" noRot="1" noChangeAspect="1" noMove="1" noResize="1" noEditPoints="1" noAdjustHandles="1" noChangeArrowheads="1" noChangeShapeType="1" noTextEdit="1"/>
-          </p:cNvSpPr>
-          <p:nvPr>
-            <p:extLst>
-              <p:ext uri="{386F3935-93C4-4BCD-93E2-E3B085C9AB24}">
-                <p16:designElem xmlns:p16="http://schemas.microsoft.com/office/powerpoint/2015/main" val="1"/>
-              </p:ext>
-            </p:extLst>
-          </p:nvPr>
-        </p:nvSpPr>
-        <p:spPr>
-          <a:xfrm>
-            <a:off x="3983736" y="1918638"/>
-            <a:ext cx="4224528" cy="3020725"/>
-          </a:xfrm>
-          <a:custGeom>
-            <a:avLst/>
-            <a:gdLst>
-              <a:gd name="connsiteX0" fmla="*/ 0 w 4224528"/>
-              <a:gd name="connsiteY0" fmla="*/ 0 h 3020725"/>
-              <a:gd name="connsiteX1" fmla="*/ 4224528 w 4224528"/>
-              <a:gd name="connsiteY1" fmla="*/ 0 h 3020725"/>
-              <a:gd name="connsiteX2" fmla="*/ 4224528 w 4224528"/>
-              <a:gd name="connsiteY2" fmla="*/ 3020725 h 3020725"/>
-              <a:gd name="connsiteX3" fmla="*/ 0 w 4224528"/>
-              <a:gd name="connsiteY3" fmla="*/ 3020725 h 3020725"/>
-            </a:gdLst>
-            <a:ahLst/>
-            <a:cxnLst>
-              <a:cxn ang="0">
-                <a:pos x="connsiteX0" y="connsiteY0"/>
-              </a:cxn>
-              <a:cxn ang="0">
-                <a:pos x="connsiteX1" y="connsiteY1"/>
-              </a:cxn>
-              <a:cxn ang="0">
-                <a:pos x="connsiteX2" y="connsiteY2"/>
-              </a:cxn>
-              <a:cxn ang="0">
-                <a:pos x="connsiteX3" y="connsiteY3"/>
-              </a:cxn>
-            </a:cxnLst>
-            <a:rect l="l" t="t" r="r" b="b"/>
-            <a:pathLst>
-              <a:path w="4224528" h="3020725">
-                <a:moveTo>
-                  <a:pt x="0" y="0"/>
-                </a:moveTo>
-                <a:lnTo>
-                  <a:pt x="4224528" y="0"/>
-                </a:lnTo>
-                <a:lnTo>
-                  <a:pt x="4224528" y="3020725"/>
-                </a:lnTo>
-                <a:lnTo>
-                  <a:pt x="0" y="3020725"/>
-                </a:lnTo>
-                <a:close/>
-              </a:path>
-            </a:pathLst>
-          </a:custGeom>
-          <a:solidFill>
-            <a:schemeClr val="tx1">
-              <a:lumMod val="75000"/>
-              <a:lumOff val="25000"/>
-            </a:schemeClr>
-          </a:solidFill>
-          <a:ln>
-            <a:noFill/>
-          </a:ln>
-        </p:spPr>
-        <p:style>
-          <a:lnRef idx="2">
-            <a:schemeClr val="accent1">
-              <a:shade val="50000"/>
-            </a:schemeClr>
-          </a:lnRef>
-          <a:fillRef idx="1">
-            <a:schemeClr val="accent1"/>
-          </a:fillRef>
-          <a:effectRef idx="0">
-            <a:schemeClr val="accent1"/>
-          </a:effectRef>
-          <a:fontRef idx="minor">
-            <a:schemeClr val="lt1"/>
-          </a:fontRef>
-        </p:style>
-        <p:txBody>
-          <a:bodyPr wrap="square" rtlCol="0" anchor="ctr">
-            <a:noAutofit/>
-          </a:bodyPr>
-          <a:lstStyle/>
-          <a:p>
-            <a:pPr algn="ctr"/>
-            <a:endParaRPr lang="en-US"/>
-          </a:p>
-        </p:txBody>
-      </p:sp>
-      <p:pic>
-        <p:nvPicPr>
-          <p:cNvPr id="19" name="Picture 18" descr="Graphical user interface, application&#10;&#10;Description automatically generated">
-            <a:extLst>
-              <a:ext uri="{FF2B5EF4-FFF2-40B4-BE49-F238E27FC236}">
-                <a16:creationId xmlns:a16="http://schemas.microsoft.com/office/drawing/2014/main" id="{B4B24954-605C-4C4C-884C-DAB27B987C14}"/>
-              </a:ext>
-            </a:extLst>
-          </p:cNvPr>
-          <p:cNvPicPr>
-            <a:picLocks noChangeAspect="1"/>
-          </p:cNvPicPr>
-          <p:nvPr/>
-        </p:nvPicPr>
-        <p:blipFill>
-          <a:blip r:embed="rId4"/>
-          <a:stretch>
-            <a:fillRect/>
-          </a:stretch>
-        </p:blipFill>
-        <p:spPr>
-          <a:xfrm>
-            <a:off x="4348015" y="2240371"/>
-            <a:ext cx="3495969" cy="2377259"/>
-          </a:xfrm>
-          <a:prstGeom prst="rect">
-            <a:avLst/>
-          </a:prstGeom>
-        </p:spPr>
-      </p:pic>
-      <p:pic>
-        <p:nvPicPr>
-          <p:cNvPr id="7" name="Picture 6" descr="Graphical user interface, application, Teams&#10;&#10;Description automatically generated">
-            <a:extLst>
-              <a:ext uri="{FF2B5EF4-FFF2-40B4-BE49-F238E27FC236}">
-                <a16:creationId xmlns:a16="http://schemas.microsoft.com/office/drawing/2014/main" id="{D1148B4A-5D8E-0745-8568-D3BCEFA8DCAB}"/>
-              </a:ext>
-            </a:extLst>
-          </p:cNvPr>
-          <p:cNvPicPr>
-            <a:picLocks noChangeAspect="1"/>
-          </p:cNvPicPr>
-          <p:nvPr/>
-        </p:nvPicPr>
-        <p:blipFill rotWithShape="1">
-          <a:blip r:embed="rId5"/>
-          <a:srcRect t="15857" r="1" b="9881"/>
-          <a:stretch/>
-        </p:blipFill>
-        <p:spPr>
-          <a:xfrm>
-            <a:off x="8621460" y="888408"/>
-            <a:ext cx="2927072" cy="1907443"/>
-          </a:xfrm>
-          <a:prstGeom prst="rect">
-            <a:avLst/>
-          </a:prstGeom>
-        </p:spPr>
-      </p:pic>
-      <p:pic>
-        <p:nvPicPr>
-          <p:cNvPr id="9" name="Picture 8" descr="Graphical user interface, application, Teams&#10;&#10;Description automatically generated">
-            <a:extLst>
-              <a:ext uri="{FF2B5EF4-FFF2-40B4-BE49-F238E27FC236}">
-                <a16:creationId xmlns:a16="http://schemas.microsoft.com/office/drawing/2014/main" id="{FAEF323E-1312-2D40-AFD9-6EBF7FFFC186}"/>
-              </a:ext>
-            </a:extLst>
-          </p:cNvPr>
-          <p:cNvPicPr>
-            <a:picLocks noChangeAspect="1"/>
-          </p:cNvPicPr>
-          <p:nvPr/>
-        </p:nvPicPr>
-        <p:blipFill rotWithShape="1">
-          <a:blip r:embed="rId6"/>
-          <a:srcRect t="13829" r="1" b="11909"/>
-          <a:stretch/>
-        </p:blipFill>
-        <p:spPr>
-          <a:xfrm>
-            <a:off x="8621460" y="4064873"/>
-            <a:ext cx="2927071" cy="1907443"/>
-          </a:xfrm>
-          <a:prstGeom prst="rect">
-            <a:avLst/>
-          </a:prstGeom>
-        </p:spPr>
-      </p:pic>
-    </p:spTree>
-    <p:extLst>
-      <p:ext uri="{BB962C8B-B14F-4D97-AF65-F5344CB8AC3E}">
-        <p14:creationId xmlns:p14="http://schemas.microsoft.com/office/powerpoint/2010/main" val="960590590"/>
-      </p:ext>
-    </p:extLst>
-  </p:cSld>
-  <p:clrMapOvr>
-    <a:masterClrMapping/>
-  </p:clrMapOvr>
-</p:sld>
-</file>
-
-<file path=ppt/slides/slide6.xml><?xml version="1.0" encoding="utf-8"?>
-<p:sld xmlns:a="http://schemas.openxmlformats.org/drawingml/2006/main" xmlns:r="http://schemas.openxmlformats.org/officeDocument/2006/relationships" xmlns:p="http://schemas.openxmlformats.org/presentationml/2006/main">
-  <p:cSld>
-    <p:bg>
-      <p:bgPr>
-        <a:solidFill>
           <a:srgbClr val="404040"/>
         </a:solidFill>
         <a:effectLst/>
@@ -12118,6 +11314,410 @@
     <p:extLst>
       <p:ext uri="{BB962C8B-B14F-4D97-AF65-F5344CB8AC3E}">
         <p14:creationId xmlns:p14="http://schemas.microsoft.com/office/powerpoint/2010/main" val="3875418188"/>
+      </p:ext>
+    </p:extLst>
+  </p:cSld>
+  <p:clrMapOvr>
+    <a:masterClrMapping/>
+  </p:clrMapOvr>
+</p:sld>
+</file>
+
+<file path=ppt/slides/slide6.xml><?xml version="1.0" encoding="utf-8"?>
+<p:sld xmlns:a="http://schemas.openxmlformats.org/drawingml/2006/main" xmlns:r="http://schemas.openxmlformats.org/officeDocument/2006/relationships" xmlns:p="http://schemas.openxmlformats.org/presentationml/2006/main">
+  <p:cSld>
+    <p:bg>
+      <p:bgPr>
+        <a:solidFill>
+          <a:schemeClr val="bg1"/>
+        </a:solidFill>
+        <a:effectLst/>
+      </p:bgPr>
+    </p:bg>
+    <p:spTree>
+      <p:nvGrpSpPr>
+        <p:cNvPr id="1" name=""/>
+        <p:cNvGrpSpPr/>
+        <p:nvPr/>
+      </p:nvGrpSpPr>
+      <p:grpSpPr>
+        <a:xfrm>
+          <a:off x="0" y="0"/>
+          <a:ext cx="0" cy="0"/>
+          <a:chOff x="0" y="0"/>
+          <a:chExt cx="0" cy="0"/>
+        </a:xfrm>
+      </p:grpSpPr>
+      <p:sp>
+        <p:nvSpPr>
+          <p:cNvPr id="14" name="Rectangle 13">
+            <a:extLst>
+              <a:ext uri="{FF2B5EF4-FFF2-40B4-BE49-F238E27FC236}">
+                <a16:creationId xmlns:a16="http://schemas.microsoft.com/office/drawing/2014/main" id="{56827C3C-D52F-46CE-A441-3CD6A1A6A0A2}"/>
+              </a:ext>
+              <a:ext uri="{C183D7F6-B498-43B3-948B-1728B52AA6E4}">
+                <adec:decorative xmlns:adec="http://schemas.microsoft.com/office/drawing/2017/decorative" val="1"/>
+              </a:ext>
+            </a:extLst>
+          </p:cNvPr>
+          <p:cNvSpPr>
+            <a:spLocks noGrp="1" noRot="1" noChangeAspect="1" noMove="1" noResize="1" noEditPoints="1" noAdjustHandles="1" noChangeArrowheads="1" noChangeShapeType="1" noTextEdit="1"/>
+          </p:cNvSpPr>
+          <p:nvPr>
+            <p:extLst>
+              <p:ext uri="{386F3935-93C4-4BCD-93E2-E3B085C9AB24}">
+                <p16:designElem xmlns:p16="http://schemas.microsoft.com/office/powerpoint/2015/main" val="1"/>
+              </p:ext>
+            </p:extLst>
+          </p:nvPr>
+        </p:nvSpPr>
+        <p:spPr>
+          <a:xfrm>
+            <a:off x="3137" y="0"/>
+            <a:ext cx="12192000" cy="6858000"/>
+          </a:xfrm>
+          <a:prstGeom prst="rect">
+            <a:avLst/>
+          </a:prstGeom>
+          <a:solidFill>
+            <a:schemeClr val="bg1">
+              <a:lumMod val="85000"/>
+              <a:alpha val="90000"/>
+            </a:schemeClr>
+          </a:solidFill>
+          <a:ln>
+            <a:noFill/>
+          </a:ln>
+        </p:spPr>
+        <p:style>
+          <a:lnRef idx="2">
+            <a:schemeClr val="accent1">
+              <a:shade val="50000"/>
+            </a:schemeClr>
+          </a:lnRef>
+          <a:fillRef idx="1">
+            <a:schemeClr val="accent1"/>
+          </a:fillRef>
+          <a:effectRef idx="0">
+            <a:schemeClr val="accent1"/>
+          </a:effectRef>
+          <a:fontRef idx="minor">
+            <a:schemeClr val="lt1"/>
+          </a:fontRef>
+        </p:style>
+        <p:txBody>
+          <a:bodyPr rtlCol="0" anchor="ctr"/>
+          <a:lstStyle/>
+          <a:p>
+            <a:pPr algn="ctr"/>
+            <a:endParaRPr lang="en-US"/>
+          </a:p>
+        </p:txBody>
+      </p:sp>
+      <p:sp>
+        <p:nvSpPr>
+          <p:cNvPr id="16" name="Rectangle 15">
+            <a:extLst>
+              <a:ext uri="{FF2B5EF4-FFF2-40B4-BE49-F238E27FC236}">
+                <a16:creationId xmlns:a16="http://schemas.microsoft.com/office/drawing/2014/main" id="{F52A8B51-0A89-497B-B882-6658E029A3F9}"/>
+              </a:ext>
+              <a:ext uri="{C183D7F6-B498-43B3-948B-1728B52AA6E4}">
+                <adec:decorative xmlns:adec="http://schemas.microsoft.com/office/drawing/2017/decorative" val="1"/>
+              </a:ext>
+            </a:extLst>
+          </p:cNvPr>
+          <p:cNvSpPr>
+            <a:spLocks noGrp="1" noRot="1" noChangeAspect="1" noMove="1" noResize="1" noEditPoints="1" noAdjustHandles="1" noChangeArrowheads="1" noChangeShapeType="1" noTextEdit="1"/>
+          </p:cNvSpPr>
+          <p:nvPr>
+            <p:extLst>
+              <p:ext uri="{386F3935-93C4-4BCD-93E2-E3B085C9AB24}">
+                <p16:designElem xmlns:p16="http://schemas.microsoft.com/office/powerpoint/2015/main" val="1"/>
+              </p:ext>
+            </p:extLst>
+          </p:nvPr>
+        </p:nvSpPr>
+        <p:spPr>
+          <a:xfrm>
+            <a:off x="643467" y="643466"/>
+            <a:ext cx="3522548" cy="5571067"/>
+          </a:xfrm>
+          <a:prstGeom prst="rect">
+            <a:avLst/>
+          </a:prstGeom>
+          <a:solidFill>
+            <a:srgbClr val="FFFFFF"/>
+          </a:solidFill>
+          <a:ln w="9525">
+            <a:noFill/>
+          </a:ln>
+          <a:effectLst>
+            <a:outerShdw blurRad="63500" dist="17780" dir="5400000" algn="t" rotWithShape="0">
+              <a:prstClr val="black">
+                <a:alpha val="43000"/>
+              </a:prstClr>
+            </a:outerShdw>
+          </a:effectLst>
+        </p:spPr>
+        <p:style>
+          <a:lnRef idx="2">
+            <a:schemeClr val="accent1">
+              <a:shade val="50000"/>
+            </a:schemeClr>
+          </a:lnRef>
+          <a:fillRef idx="1">
+            <a:schemeClr val="accent1"/>
+          </a:fillRef>
+          <a:effectRef idx="0">
+            <a:schemeClr val="accent1"/>
+          </a:effectRef>
+          <a:fontRef idx="minor">
+            <a:schemeClr val="lt1"/>
+          </a:fontRef>
+        </p:style>
+        <p:txBody>
+          <a:bodyPr rtlCol="0" anchor="ctr"/>
+          <a:lstStyle/>
+          <a:p>
+            <a:pPr algn="ctr"/>
+            <a:endParaRPr lang="en-US"/>
+          </a:p>
+        </p:txBody>
+      </p:sp>
+      <p:sp>
+        <p:nvSpPr>
+          <p:cNvPr id="18" name="Rectangle 17">
+            <a:extLst>
+              <a:ext uri="{FF2B5EF4-FFF2-40B4-BE49-F238E27FC236}">
+                <a16:creationId xmlns:a16="http://schemas.microsoft.com/office/drawing/2014/main" id="{EB1CEFBF-6F09-4052-862B-E219DA15757E}"/>
+              </a:ext>
+              <a:ext uri="{C183D7F6-B498-43B3-948B-1728B52AA6E4}">
+                <adec:decorative xmlns:adec="http://schemas.microsoft.com/office/drawing/2017/decorative" val="1"/>
+              </a:ext>
+            </a:extLst>
+          </p:cNvPr>
+          <p:cNvSpPr>
+            <a:spLocks noGrp="1" noRot="1" noChangeAspect="1" noMove="1" noResize="1" noEditPoints="1" noAdjustHandles="1" noChangeArrowheads="1" noChangeShapeType="1" noTextEdit="1"/>
+          </p:cNvSpPr>
+          <p:nvPr>
+            <p:extLst>
+              <p:ext uri="{386F3935-93C4-4BCD-93E2-E3B085C9AB24}">
+                <p16:designElem xmlns:p16="http://schemas.microsoft.com/office/powerpoint/2015/main" val="1"/>
+              </p:ext>
+            </p:extLst>
+          </p:nvPr>
+        </p:nvSpPr>
+        <p:spPr>
+          <a:xfrm>
+            <a:off x="4326882" y="643466"/>
+            <a:ext cx="3522548" cy="5571067"/>
+          </a:xfrm>
+          <a:prstGeom prst="rect">
+            <a:avLst/>
+          </a:prstGeom>
+          <a:solidFill>
+            <a:srgbClr val="FFFFFF"/>
+          </a:solidFill>
+          <a:ln w="9525">
+            <a:noFill/>
+          </a:ln>
+          <a:effectLst>
+            <a:outerShdw blurRad="63500" dist="17780" dir="5400000" algn="t" rotWithShape="0">
+              <a:prstClr val="black">
+                <a:alpha val="43000"/>
+              </a:prstClr>
+            </a:outerShdw>
+          </a:effectLst>
+        </p:spPr>
+        <p:style>
+          <a:lnRef idx="2">
+            <a:schemeClr val="accent1">
+              <a:shade val="50000"/>
+            </a:schemeClr>
+          </a:lnRef>
+          <a:fillRef idx="1">
+            <a:schemeClr val="accent1"/>
+          </a:fillRef>
+          <a:effectRef idx="0">
+            <a:schemeClr val="accent1"/>
+          </a:effectRef>
+          <a:fontRef idx="minor">
+            <a:schemeClr val="lt1"/>
+          </a:fontRef>
+        </p:style>
+        <p:txBody>
+          <a:bodyPr rtlCol="0" anchor="ctr"/>
+          <a:lstStyle/>
+          <a:p>
+            <a:pPr algn="ctr"/>
+            <a:endParaRPr lang="en-US"/>
+          </a:p>
+        </p:txBody>
+      </p:sp>
+      <p:pic>
+        <p:nvPicPr>
+          <p:cNvPr id="9" name="Picture 8" descr="Graphical user interface&#10;&#10;Description automatically generated">
+            <a:extLst>
+              <a:ext uri="{FF2B5EF4-FFF2-40B4-BE49-F238E27FC236}">
+                <a16:creationId xmlns:a16="http://schemas.microsoft.com/office/drawing/2014/main" id="{1D235528-21ED-E94C-A849-3B1D6E9FDAD4}"/>
+              </a:ext>
+            </a:extLst>
+          </p:cNvPr>
+          <p:cNvPicPr>
+            <a:picLocks noChangeAspect="1"/>
+          </p:cNvPicPr>
+          <p:nvPr/>
+        </p:nvPicPr>
+        <p:blipFill>
+          <a:blip r:embed="rId2"/>
+          <a:stretch>
+            <a:fillRect/>
+          </a:stretch>
+        </p:blipFill>
+        <p:spPr>
+          <a:xfrm>
+            <a:off x="4647976" y="2043334"/>
+            <a:ext cx="2880360" cy="2772346"/>
+          </a:xfrm>
+          <a:prstGeom prst="rect">
+            <a:avLst/>
+          </a:prstGeom>
+        </p:spPr>
+      </p:pic>
+      <p:sp>
+        <p:nvSpPr>
+          <p:cNvPr id="20" name="Rectangle 19">
+            <a:extLst>
+              <a:ext uri="{FF2B5EF4-FFF2-40B4-BE49-F238E27FC236}">
+                <a16:creationId xmlns:a16="http://schemas.microsoft.com/office/drawing/2014/main" id="{BCB5D417-2A71-445D-B4C7-9E814D633D33}"/>
+              </a:ext>
+              <a:ext uri="{C183D7F6-B498-43B3-948B-1728B52AA6E4}">
+                <adec:decorative xmlns:adec="http://schemas.microsoft.com/office/drawing/2017/decorative" val="1"/>
+              </a:ext>
+            </a:extLst>
+          </p:cNvPr>
+          <p:cNvSpPr>
+            <a:spLocks noGrp="1" noRot="1" noChangeAspect="1" noMove="1" noResize="1" noEditPoints="1" noAdjustHandles="1" noChangeArrowheads="1" noChangeShapeType="1" noTextEdit="1"/>
+          </p:cNvSpPr>
+          <p:nvPr>
+            <p:extLst>
+              <p:ext uri="{386F3935-93C4-4BCD-93E2-E3B085C9AB24}">
+                <p16:designElem xmlns:p16="http://schemas.microsoft.com/office/powerpoint/2015/main" val="1"/>
+              </p:ext>
+            </p:extLst>
+          </p:nvPr>
+        </p:nvSpPr>
+        <p:spPr>
+          <a:xfrm>
+            <a:off x="8022847" y="643466"/>
+            <a:ext cx="3522548" cy="5571067"/>
+          </a:xfrm>
+          <a:prstGeom prst="rect">
+            <a:avLst/>
+          </a:prstGeom>
+          <a:solidFill>
+            <a:srgbClr val="FFFFFF"/>
+          </a:solidFill>
+          <a:ln w="9525">
+            <a:noFill/>
+          </a:ln>
+          <a:effectLst>
+            <a:outerShdw blurRad="63500" dist="17780" dir="5400000" algn="t" rotWithShape="0">
+              <a:prstClr val="black">
+                <a:alpha val="43000"/>
+              </a:prstClr>
+            </a:outerShdw>
+          </a:effectLst>
+        </p:spPr>
+        <p:style>
+          <a:lnRef idx="2">
+            <a:schemeClr val="accent1">
+              <a:shade val="50000"/>
+            </a:schemeClr>
+          </a:lnRef>
+          <a:fillRef idx="1">
+            <a:schemeClr val="accent1"/>
+          </a:fillRef>
+          <a:effectRef idx="0">
+            <a:schemeClr val="accent1"/>
+          </a:effectRef>
+          <a:fontRef idx="minor">
+            <a:schemeClr val="lt1"/>
+          </a:fontRef>
+        </p:style>
+        <p:txBody>
+          <a:bodyPr rtlCol="0" anchor="ctr"/>
+          <a:lstStyle/>
+          <a:p>
+            <a:pPr algn="ctr"/>
+            <a:endParaRPr lang="en-US"/>
+          </a:p>
+        </p:txBody>
+      </p:sp>
+      <p:pic>
+        <p:nvPicPr>
+          <p:cNvPr id="7" name="Picture 6" descr="Graphical user interface&#10;&#10;Description automatically generated">
+            <a:extLst>
+              <a:ext uri="{FF2B5EF4-FFF2-40B4-BE49-F238E27FC236}">
+                <a16:creationId xmlns:a16="http://schemas.microsoft.com/office/drawing/2014/main" id="{12519667-BBC6-2B41-AAB7-AFC714D11AE1}"/>
+              </a:ext>
+            </a:extLst>
+          </p:cNvPr>
+          <p:cNvPicPr>
+            <a:picLocks noChangeAspect="1"/>
+          </p:cNvPicPr>
+          <p:nvPr/>
+        </p:nvPicPr>
+        <p:blipFill>
+          <a:blip r:embed="rId3"/>
+          <a:stretch>
+            <a:fillRect/>
+          </a:stretch>
+        </p:blipFill>
+        <p:spPr>
+          <a:xfrm>
+            <a:off x="964561" y="2026038"/>
+            <a:ext cx="2880360" cy="2765145"/>
+          </a:xfrm>
+          <a:prstGeom prst="rect">
+            <a:avLst/>
+          </a:prstGeom>
+        </p:spPr>
+      </p:pic>
+      <p:pic>
+        <p:nvPicPr>
+          <p:cNvPr id="5" name="Picture 4" descr="Graphical user interface&#10;&#10;Description automatically generated">
+            <a:extLst>
+              <a:ext uri="{FF2B5EF4-FFF2-40B4-BE49-F238E27FC236}">
+                <a16:creationId xmlns:a16="http://schemas.microsoft.com/office/drawing/2014/main" id="{7CDF2D86-BDAD-8B4A-A906-C0019A747885}"/>
+              </a:ext>
+            </a:extLst>
+          </p:cNvPr>
+          <p:cNvPicPr>
+            <a:picLocks noChangeAspect="1"/>
+          </p:cNvPicPr>
+          <p:nvPr/>
+        </p:nvPicPr>
+        <p:blipFill>
+          <a:blip r:embed="rId4"/>
+          <a:stretch>
+            <a:fillRect/>
+          </a:stretch>
+        </p:blipFill>
+        <p:spPr>
+          <a:xfrm>
+            <a:off x="8344579" y="2026038"/>
+            <a:ext cx="2879083" cy="2778315"/>
+          </a:xfrm>
+          <a:prstGeom prst="rect">
+            <a:avLst/>
+          </a:prstGeom>
+        </p:spPr>
+      </p:pic>
+    </p:spTree>
+    <p:extLst>
+      <p:ext uri="{BB962C8B-B14F-4D97-AF65-F5344CB8AC3E}">
+        <p14:creationId xmlns:p14="http://schemas.microsoft.com/office/powerpoint/2010/main" val="3108340647"/>
       </p:ext>
     </p:extLst>
   </p:cSld>

</xml_diff>